<commit_message>
Styled Recipes template. Corrected JS import issue on Recipes template.
</commit_message>
<xml_diff>
--- a/SecondPresentation.pptx
+++ b/SecondPresentation.pptx
@@ -5,16 +5,17 @@
     <p:sldMasterId id="2147483648" r:id="rId1"/>
   </p:sldMasterIdLst>
   <p:notesMasterIdLst>
-    <p:notesMasterId r:id="rId9"/>
+    <p:notesMasterId r:id="rId10"/>
   </p:notesMasterIdLst>
   <p:sldIdLst>
     <p:sldId id="262" r:id="rId2"/>
     <p:sldId id="265" r:id="rId3"/>
-    <p:sldId id="266" r:id="rId4"/>
-    <p:sldId id="268" r:id="rId5"/>
-    <p:sldId id="267" r:id="rId6"/>
-    <p:sldId id="270" r:id="rId7"/>
-    <p:sldId id="269" r:id="rId8"/>
+    <p:sldId id="271" r:id="rId4"/>
+    <p:sldId id="266" r:id="rId5"/>
+    <p:sldId id="268" r:id="rId6"/>
+    <p:sldId id="267" r:id="rId7"/>
+    <p:sldId id="270" r:id="rId8"/>
+    <p:sldId id="269" r:id="rId9"/>
   </p:sldIdLst>
   <p:sldSz cx="12192000" cy="6858000"/>
   <p:notesSz cx="6858000" cy="9144000"/>
@@ -203,7 +204,7 @@
           <a:p>
             <a:fld id="{B6C0561D-6E65-4779-8689-F523603A3DDD}" type="datetimeFigureOut">
               <a:rPr lang="en-US" smtClean="0"/>
-              <a:t>11/3/2019</a:t>
+              <a:t>11/4/2019</a:t>
             </a:fld>
             <a:endParaRPr lang="en-US"/>
           </a:p>
@@ -721,7 +722,7 @@
     </p:spTree>
     <p:extLst>
       <p:ext uri="{BB962C8B-B14F-4D97-AF65-F5344CB8AC3E}">
-        <p14:creationId xmlns:p14="http://schemas.microsoft.com/office/powerpoint/2010/main" val="2945440330"/>
+        <p14:creationId xmlns:p14="http://schemas.microsoft.com/office/powerpoint/2010/main" val="3176998887"/>
       </p:ext>
     </p:extLst>
   </p:cSld>
@@ -808,7 +809,7 @@
     </p:spTree>
     <p:extLst>
       <p:ext uri="{BB962C8B-B14F-4D97-AF65-F5344CB8AC3E}">
-        <p14:creationId xmlns:p14="http://schemas.microsoft.com/office/powerpoint/2010/main" val="2327931572"/>
+        <p14:creationId xmlns:p14="http://schemas.microsoft.com/office/powerpoint/2010/main" val="2945440330"/>
       </p:ext>
     </p:extLst>
   </p:cSld>
@@ -895,7 +896,7 @@
     </p:spTree>
     <p:extLst>
       <p:ext uri="{BB962C8B-B14F-4D97-AF65-F5344CB8AC3E}">
-        <p14:creationId xmlns:p14="http://schemas.microsoft.com/office/powerpoint/2010/main" val="1722338640"/>
+        <p14:creationId xmlns:p14="http://schemas.microsoft.com/office/powerpoint/2010/main" val="2327931572"/>
       </p:ext>
     </p:extLst>
   </p:cSld>
@@ -982,7 +983,7 @@
     </p:spTree>
     <p:extLst>
       <p:ext uri="{BB962C8B-B14F-4D97-AF65-F5344CB8AC3E}">
-        <p14:creationId xmlns:p14="http://schemas.microsoft.com/office/powerpoint/2010/main" val="3880787153"/>
+        <p14:creationId xmlns:p14="http://schemas.microsoft.com/office/powerpoint/2010/main" val="1722338640"/>
       </p:ext>
     </p:extLst>
   </p:cSld>
@@ -1061,6 +1062,93 @@
             <a:fld id="{34183C30-C335-4E0B-914B-A5F4AAEA7570}" type="slidenum">
               <a:rPr lang="en-US" smtClean="0"/>
               <a:t>7</a:t>
+            </a:fld>
+            <a:endParaRPr lang="en-US"/>
+          </a:p>
+        </p:txBody>
+      </p:sp>
+    </p:spTree>
+    <p:extLst>
+      <p:ext uri="{BB962C8B-B14F-4D97-AF65-F5344CB8AC3E}">
+        <p14:creationId xmlns:p14="http://schemas.microsoft.com/office/powerpoint/2010/main" val="3880787153"/>
+      </p:ext>
+    </p:extLst>
+  </p:cSld>
+  <p:clrMapOvr>
+    <a:masterClrMapping/>
+  </p:clrMapOvr>
+</p:notes>
+</file>
+
+<file path=ppt/notesSlides/notesSlide8.xml><?xml version="1.0" encoding="utf-8"?>
+<p:notes xmlns:a="http://schemas.openxmlformats.org/drawingml/2006/main" xmlns:r="http://schemas.openxmlformats.org/officeDocument/2006/relationships" xmlns:p="http://schemas.openxmlformats.org/presentationml/2006/main">
+  <p:cSld>
+    <p:spTree>
+      <p:nvGrpSpPr>
+        <p:cNvPr id="1" name=""/>
+        <p:cNvGrpSpPr/>
+        <p:nvPr/>
+      </p:nvGrpSpPr>
+      <p:grpSpPr>
+        <a:xfrm>
+          <a:off x="0" y="0"/>
+          <a:ext cx="0" cy="0"/>
+          <a:chOff x="0" y="0"/>
+          <a:chExt cx="0" cy="0"/>
+        </a:xfrm>
+      </p:grpSpPr>
+      <p:sp>
+        <p:nvSpPr>
+          <p:cNvPr id="2" name="Slide Image Placeholder 1"/>
+          <p:cNvSpPr>
+            <a:spLocks noGrp="1" noRot="1" noChangeAspect="1"/>
+          </p:cNvSpPr>
+          <p:nvPr>
+            <p:ph type="sldImg"/>
+          </p:nvPr>
+        </p:nvSpPr>
+        <p:spPr/>
+      </p:sp>
+      <p:sp>
+        <p:nvSpPr>
+          <p:cNvPr id="3" name="Notes Placeholder 2"/>
+          <p:cNvSpPr>
+            <a:spLocks noGrp="1"/>
+          </p:cNvSpPr>
+          <p:nvPr>
+            <p:ph type="body" idx="1"/>
+          </p:nvPr>
+        </p:nvSpPr>
+        <p:spPr/>
+        <p:txBody>
+          <a:bodyPr/>
+          <a:lstStyle/>
+          <a:p>
+            <a:r>
+              <a:rPr lang="en-US" dirty="0"/>
+              <a:t>Proposal</a:t>
+            </a:r>
+          </a:p>
+        </p:txBody>
+      </p:sp>
+      <p:sp>
+        <p:nvSpPr>
+          <p:cNvPr id="4" name="Slide Number Placeholder 3"/>
+          <p:cNvSpPr>
+            <a:spLocks noGrp="1"/>
+          </p:cNvSpPr>
+          <p:nvPr>
+            <p:ph type="sldNum" sz="quarter" idx="5"/>
+          </p:nvPr>
+        </p:nvSpPr>
+        <p:spPr/>
+        <p:txBody>
+          <a:bodyPr/>
+          <a:lstStyle/>
+          <a:p>
+            <a:fld id="{34183C30-C335-4E0B-914B-A5F4AAEA7570}" type="slidenum">
+              <a:rPr lang="en-US" smtClean="0"/>
+              <a:t>8</a:t>
             </a:fld>
             <a:endParaRPr lang="en-US"/>
           </a:p>
@@ -1226,7 +1314,7 @@
           <a:p>
             <a:fld id="{B1C4178F-1736-4F41-BF4A-731F588A4210}" type="datetimeFigureOut">
               <a:rPr lang="en-US" smtClean="0"/>
-              <a:t>11/3/2019</a:t>
+              <a:t>11/4/2019</a:t>
             </a:fld>
             <a:endParaRPr lang="en-US"/>
           </a:p>
@@ -1424,7 +1512,7 @@
           <a:p>
             <a:fld id="{B1C4178F-1736-4F41-BF4A-731F588A4210}" type="datetimeFigureOut">
               <a:rPr lang="en-US" smtClean="0"/>
-              <a:t>11/3/2019</a:t>
+              <a:t>11/4/2019</a:t>
             </a:fld>
             <a:endParaRPr lang="en-US"/>
           </a:p>
@@ -1632,7 +1720,7 @@
           <a:p>
             <a:fld id="{B1C4178F-1736-4F41-BF4A-731F588A4210}" type="datetimeFigureOut">
               <a:rPr lang="en-US" smtClean="0"/>
-              <a:t>11/3/2019</a:t>
+              <a:t>11/4/2019</a:t>
             </a:fld>
             <a:endParaRPr lang="en-US"/>
           </a:p>
@@ -1830,7 +1918,7 @@
           <a:p>
             <a:fld id="{B1C4178F-1736-4F41-BF4A-731F588A4210}" type="datetimeFigureOut">
               <a:rPr lang="en-US" smtClean="0"/>
-              <a:t>11/3/2019</a:t>
+              <a:t>11/4/2019</a:t>
             </a:fld>
             <a:endParaRPr lang="en-US"/>
           </a:p>
@@ -2105,7 +2193,7 @@
           <a:p>
             <a:fld id="{B1C4178F-1736-4F41-BF4A-731F588A4210}" type="datetimeFigureOut">
               <a:rPr lang="en-US" smtClean="0"/>
-              <a:t>11/3/2019</a:t>
+              <a:t>11/4/2019</a:t>
             </a:fld>
             <a:endParaRPr lang="en-US"/>
           </a:p>
@@ -2370,7 +2458,7 @@
           <a:p>
             <a:fld id="{B1C4178F-1736-4F41-BF4A-731F588A4210}" type="datetimeFigureOut">
               <a:rPr lang="en-US" smtClean="0"/>
-              <a:t>11/3/2019</a:t>
+              <a:t>11/4/2019</a:t>
             </a:fld>
             <a:endParaRPr lang="en-US"/>
           </a:p>
@@ -2782,7 +2870,7 @@
           <a:p>
             <a:fld id="{B1C4178F-1736-4F41-BF4A-731F588A4210}" type="datetimeFigureOut">
               <a:rPr lang="en-US" smtClean="0"/>
-              <a:t>11/3/2019</a:t>
+              <a:t>11/4/2019</a:t>
             </a:fld>
             <a:endParaRPr lang="en-US"/>
           </a:p>
@@ -2923,7 +3011,7 @@
           <a:p>
             <a:fld id="{B1C4178F-1736-4F41-BF4A-731F588A4210}" type="datetimeFigureOut">
               <a:rPr lang="en-US" smtClean="0"/>
-              <a:t>11/3/2019</a:t>
+              <a:t>11/4/2019</a:t>
             </a:fld>
             <a:endParaRPr lang="en-US"/>
           </a:p>
@@ -3036,7 +3124,7 @@
           <a:p>
             <a:fld id="{B1C4178F-1736-4F41-BF4A-731F588A4210}" type="datetimeFigureOut">
               <a:rPr lang="en-US" smtClean="0"/>
-              <a:t>11/3/2019</a:t>
+              <a:t>11/4/2019</a:t>
             </a:fld>
             <a:endParaRPr lang="en-US"/>
           </a:p>
@@ -3347,7 +3435,7 @@
           <a:p>
             <a:fld id="{B1C4178F-1736-4F41-BF4A-731F588A4210}" type="datetimeFigureOut">
               <a:rPr lang="en-US" smtClean="0"/>
-              <a:t>11/3/2019</a:t>
+              <a:t>11/4/2019</a:t>
             </a:fld>
             <a:endParaRPr lang="en-US"/>
           </a:p>
@@ -3635,7 +3723,7 @@
           <a:p>
             <a:fld id="{B1C4178F-1736-4F41-BF4A-731F588A4210}" type="datetimeFigureOut">
               <a:rPr lang="en-US" smtClean="0"/>
-              <a:t>11/3/2019</a:t>
+              <a:t>11/4/2019</a:t>
             </a:fld>
             <a:endParaRPr lang="en-US"/>
           </a:p>
@@ -3876,7 +3964,7 @@
           <a:p>
             <a:fld id="{B1C4178F-1736-4F41-BF4A-731F588A4210}" type="datetimeFigureOut">
               <a:rPr lang="en-US" smtClean="0"/>
-              <a:t>11/3/2019</a:t>
+              <a:t>11/4/2019</a:t>
             </a:fld>
             <a:endParaRPr lang="en-US"/>
           </a:p>
@@ -4605,6 +4693,38 @@
               </a:rPr>
               <a:t>Matt Imel</a:t>
             </a:r>
+            <a:br>
+              <a:rPr lang="en-US" dirty="0">
+                <a:solidFill>
+                  <a:schemeClr val="bg1"/>
+                </a:solidFill>
+                <a:latin typeface="Quicksand" panose="02070303000000060000" pitchFamily="18" charset="0"/>
+              </a:rPr>
+            </a:br>
+            <a:r>
+              <a:rPr lang="en-US" dirty="0">
+                <a:solidFill>
+                  <a:schemeClr val="bg1"/>
+                </a:solidFill>
+                <a:latin typeface="Quicksand" panose="02070303000000060000" pitchFamily="18" charset="0"/>
+              </a:rPr>
+              <a:t>Advisor: Prof. </a:t>
+            </a:r>
+            <a:r>
+              <a:rPr lang="en-US" dirty="0" err="1">
+                <a:solidFill>
+                  <a:schemeClr val="bg1"/>
+                </a:solidFill>
+                <a:latin typeface="Quicksand" panose="02070303000000060000" pitchFamily="18" charset="0"/>
+              </a:rPr>
+              <a:t>Neilsen</a:t>
+            </a:r>
+            <a:endParaRPr lang="en-US" dirty="0">
+              <a:solidFill>
+                <a:schemeClr val="bg1"/>
+              </a:solidFill>
+              <a:latin typeface="Quicksand" panose="02070303000000060000" pitchFamily="18" charset="0"/>
+            </a:endParaRPr>
           </a:p>
         </p:txBody>
       </p:sp>
@@ -5066,7 +5186,7 @@
                 </a:effectLst>
                 <a:latin typeface="Quicksand" panose="02070303000000060000" pitchFamily="18" charset="0"/>
               </a:rPr>
-              <a:t>Promotes a collaborative and constructive environment around creating and refining recipes.</a:t>
+              <a:t>Motivation: Promotion of a collaborative and constructive environment around creating and refining recipes.</a:t>
             </a:r>
           </a:p>
           <a:p>
@@ -5087,7 +5207,28 @@
                 </a:effectLst>
                 <a:latin typeface="Quicksand" panose="02070303000000060000" pitchFamily="18" charset="0"/>
               </a:rPr>
-              <a:t>Allow users to upload “Variants” to recipes. Variants can be tagged not only by cuisine or type, but by intent.</a:t>
+              <a:t>Allow users to create profiles and upload recipes.</a:t>
+            </a:r>
+          </a:p>
+          <a:p>
+            <a:pPr marL="0" indent="0">
+              <a:buNone/>
+            </a:pPr>
+            <a:r>
+              <a:rPr lang="en-US" b="1" dirty="0">
+                <a:solidFill>
+                  <a:schemeClr val="bg1"/>
+                </a:solidFill>
+                <a:effectLst>
+                  <a:outerShdw blurRad="38100" dist="38100" dir="2700000" algn="tl">
+                    <a:srgbClr val="000000">
+                      <a:alpha val="43137"/>
+                    </a:srgbClr>
+                  </a:outerShdw>
+                </a:effectLst>
+                <a:latin typeface="Quicksand" panose="02070303000000060000" pitchFamily="18" charset="0"/>
+              </a:rPr>
+              <a:t>Allow users to upload “variants” to recipes which are attached to their comments. Variants can be tagged not only by cuisine or type, but by intent.</a:t>
             </a:r>
             <a:br>
               <a:rPr lang="en-US" b="1" dirty="0">
@@ -5133,7 +5274,7 @@
                 </a:effectLst>
                 <a:latin typeface="Quicksand" panose="02070303000000060000" pitchFamily="18" charset="0"/>
               </a:rPr>
-              <a:t>Webpage, using </a:t>
+              <a:t>Uses </a:t>
             </a:r>
             <a:r>
               <a:rPr lang="en-US" b="1" dirty="0" err="1">
@@ -5165,7 +5306,7 @@
                 </a:effectLst>
                 <a:latin typeface="Quicksand" panose="02070303000000060000" pitchFamily="18" charset="0"/>
               </a:rPr>
-              <a:t> as a framework.</a:t>
+              <a:t> as a web framework, MySQL as the database system.</a:t>
             </a:r>
           </a:p>
         </p:txBody>
@@ -5437,7 +5578,7 @@
           <a:lstStyle/>
           <a:p>
             <a:pPr algn="ctr"/>
-            <a:endParaRPr lang="en-US" dirty="0"/>
+            <a:endParaRPr lang="en-US"/>
           </a:p>
         </p:txBody>
       </p:sp>
@@ -5581,7 +5722,7 @@
                 </a:solidFill>
                 <a:latin typeface="Quicksand" panose="02070303000000060000" pitchFamily="18" charset="0"/>
               </a:rPr>
-              <a:t>Login System (/)</a:t>
+              <a:t>Database</a:t>
             </a:r>
           </a:p>
         </p:txBody>
@@ -5706,10 +5847,10 @@
       </p:sp>
       <p:pic>
         <p:nvPicPr>
-          <p:cNvPr id="11" name="Picture 10">
-            <a:extLst>
-              <a:ext uri="{FF2B5EF4-FFF2-40B4-BE49-F238E27FC236}">
-                <a16:creationId xmlns:a16="http://schemas.microsoft.com/office/drawing/2014/main" id="{1979B55E-DCD3-4F09-8287-2F2201387C7E}"/>
+          <p:cNvPr id="6" name="Picture 5">
+            <a:extLst>
+              <a:ext uri="{FF2B5EF4-FFF2-40B4-BE49-F238E27FC236}">
+                <a16:creationId xmlns:a16="http://schemas.microsoft.com/office/drawing/2014/main" id="{B03EE2A0-DADB-4CFF-A4BB-FCEB52CE9F7B}"/>
               </a:ext>
             </a:extLst>
           </p:cNvPr>
@@ -5726,18 +5867,97 @@
         </p:blipFill>
         <p:spPr>
           <a:xfrm>
-            <a:off x="468312" y="1439069"/>
-            <a:ext cx="8258175" cy="5124450"/>
+            <a:off x="333290" y="1690688"/>
+            <a:ext cx="9712753" cy="4021469"/>
           </a:xfrm>
           <a:prstGeom prst="rect">
             <a:avLst/>
           </a:prstGeom>
         </p:spPr>
       </p:pic>
+      <p:sp>
+        <p:nvSpPr>
+          <p:cNvPr id="11" name="Content Placeholder 2">
+            <a:extLst>
+              <a:ext uri="{FF2B5EF4-FFF2-40B4-BE49-F238E27FC236}">
+                <a16:creationId xmlns:a16="http://schemas.microsoft.com/office/drawing/2014/main" id="{51D9963E-FF92-46D0-A5D6-B8B18BEBC35A}"/>
+              </a:ext>
+            </a:extLst>
+          </p:cNvPr>
+          <p:cNvSpPr>
+            <a:spLocks noGrp="1"/>
+          </p:cNvSpPr>
+          <p:nvPr>
+            <p:ph idx="1"/>
+          </p:nvPr>
+        </p:nvSpPr>
+        <p:spPr>
+          <a:xfrm>
+            <a:off x="838200" y="5712157"/>
+            <a:ext cx="9166653" cy="1145843"/>
+          </a:xfrm>
+        </p:spPr>
+        <p:txBody>
+          <a:bodyPr>
+            <a:normAutofit/>
+          </a:bodyPr>
+          <a:lstStyle/>
+          <a:p>
+            <a:pPr marL="0" indent="0">
+              <a:buNone/>
+            </a:pPr>
+            <a:r>
+              <a:rPr lang="en-US" sz="1800" b="1" dirty="0">
+                <a:solidFill>
+                  <a:schemeClr val="bg1"/>
+                </a:solidFill>
+                <a:effectLst>
+                  <a:outerShdw blurRad="38100" dist="38100" dir="2700000" algn="tl">
+                    <a:srgbClr val="000000">
+                      <a:alpha val="43137"/>
+                    </a:srgbClr>
+                  </a:outerShdw>
+                </a:effectLst>
+                <a:latin typeface="Quicksand" panose="02070303000000060000" pitchFamily="18" charset="0"/>
+              </a:rPr>
+              <a:t>Courtesy of </a:t>
+            </a:r>
+            <a:r>
+              <a:rPr lang="en-US" sz="1800" b="1" dirty="0" err="1">
+                <a:solidFill>
+                  <a:schemeClr val="bg1"/>
+                </a:solidFill>
+                <a:effectLst>
+                  <a:outerShdw blurRad="38100" dist="38100" dir="2700000" algn="tl">
+                    <a:srgbClr val="000000">
+                      <a:alpha val="43137"/>
+                    </a:srgbClr>
+                  </a:outerShdw>
+                </a:effectLst>
+                <a:latin typeface="Quicksand" panose="02070303000000060000" pitchFamily="18" charset="0"/>
+              </a:rPr>
+              <a:t>QuickDBD</a:t>
+            </a:r>
+            <a:endParaRPr lang="en-US" sz="1800" b="1" dirty="0">
+              <a:solidFill>
+                <a:schemeClr val="bg1"/>
+              </a:solidFill>
+              <a:effectLst>
+                <a:outerShdw blurRad="38100" dist="38100" dir="2700000" algn="tl">
+                  <a:srgbClr val="000000">
+                    <a:alpha val="43137"/>
+                  </a:srgbClr>
+                </a:outerShdw>
+              </a:effectLst>
+              <a:latin typeface="Quicksand" panose="02070303000000060000" pitchFamily="18" charset="0"/>
+            </a:endParaRPr>
+          </a:p>
+        </p:txBody>
+      </p:sp>
     </p:spTree>
     <p:extLst>
       <p:ext uri="{BB962C8B-B14F-4D97-AF65-F5344CB8AC3E}">
-        <p14:creationId xmlns:p14="http://schemas.microsoft.com/office/powerpoint/2010/main" val="2252199940"/>
+        <p14:creationId xmlns:p14="http://schemas.microsoft.com/office/powerpoint/2010/main" val="3117628142"/>
       </p:ext>
     </p:extLst>
   </p:cSld>
@@ -6027,7 +6247,7 @@
                 </a:solidFill>
                 <a:latin typeface="Quicksand" panose="02070303000000060000" pitchFamily="18" charset="0"/>
               </a:rPr>
-              <a:t>Create Recipe Form (/create)</a:t>
+              <a:t>Login System (/login)</a:t>
             </a:r>
           </a:p>
         </p:txBody>
@@ -6152,10 +6372,10 @@
       </p:sp>
       <p:pic>
         <p:nvPicPr>
-          <p:cNvPr id="3" name="Picture 2">
-            <a:extLst>
-              <a:ext uri="{FF2B5EF4-FFF2-40B4-BE49-F238E27FC236}">
-                <a16:creationId xmlns:a16="http://schemas.microsoft.com/office/drawing/2014/main" id="{089164DD-B509-42CD-A180-98E15C945FC9}"/>
+          <p:cNvPr id="11" name="Picture 10">
+            <a:extLst>
+              <a:ext uri="{FF2B5EF4-FFF2-40B4-BE49-F238E27FC236}">
+                <a16:creationId xmlns:a16="http://schemas.microsoft.com/office/drawing/2014/main" id="{1979B55E-DCD3-4F09-8287-2F2201387C7E}"/>
               </a:ext>
             </a:extLst>
           </p:cNvPr>
@@ -6172,8 +6392,8 @@
         </p:blipFill>
         <p:spPr>
           <a:xfrm>
-            <a:off x="507456" y="1516165"/>
-            <a:ext cx="9105900" cy="5000625"/>
+            <a:off x="468312" y="1439069"/>
+            <a:ext cx="8258175" cy="5124450"/>
           </a:xfrm>
           <a:prstGeom prst="rect">
             <a:avLst/>
@@ -6183,7 +6403,7 @@
     </p:spTree>
     <p:extLst>
       <p:ext uri="{BB962C8B-B14F-4D97-AF65-F5344CB8AC3E}">
-        <p14:creationId xmlns:p14="http://schemas.microsoft.com/office/powerpoint/2010/main" val="3497621925"/>
+        <p14:creationId xmlns:p14="http://schemas.microsoft.com/office/powerpoint/2010/main" val="2252199940"/>
       </p:ext>
     </p:extLst>
   </p:cSld>
@@ -6473,23 +6693,8 @@
                 </a:solidFill>
                 <a:latin typeface="Quicksand" panose="02070303000000060000" pitchFamily="18" charset="0"/>
               </a:rPr>
-              <a:t>Recipe Page (/recipes</a:t>
-            </a:r>
-            <a:r>
-              <a:rPr lang="en-US" b="1">
-                <a:solidFill>
-                  <a:schemeClr val="bg1"/>
-                </a:solidFill>
-                <a:latin typeface="Quicksand" panose="02070303000000060000" pitchFamily="18" charset="0"/>
-              </a:rPr>
-              <a:t>/:slug)</a:t>
-            </a:r>
-            <a:endParaRPr lang="en-US" b="1" dirty="0">
-              <a:solidFill>
-                <a:schemeClr val="bg1"/>
-              </a:solidFill>
-              <a:latin typeface="Quicksand" panose="02070303000000060000" pitchFamily="18" charset="0"/>
-            </a:endParaRPr>
+              <a:t>Create Recipe Form (/create)</a:t>
+            </a:r>
           </a:p>
         </p:txBody>
       </p:sp>
@@ -6616,7 +6821,7 @@
           <p:cNvPr id="3" name="Picture 2">
             <a:extLst>
               <a:ext uri="{FF2B5EF4-FFF2-40B4-BE49-F238E27FC236}">
-                <a16:creationId xmlns:a16="http://schemas.microsoft.com/office/drawing/2014/main" id="{617AA094-363D-4AAD-93CB-8696CADC7C0B}"/>
+                <a16:creationId xmlns:a16="http://schemas.microsoft.com/office/drawing/2014/main" id="{089164DD-B509-42CD-A180-98E15C945FC9}"/>
               </a:ext>
             </a:extLst>
           </p:cNvPr>
@@ -6633,8 +6838,8 @@
         </p:blipFill>
         <p:spPr>
           <a:xfrm>
-            <a:off x="611883" y="1645623"/>
-            <a:ext cx="9134475" cy="2676525"/>
+            <a:off x="507456" y="1516165"/>
+            <a:ext cx="9105900" cy="5000625"/>
           </a:xfrm>
           <a:prstGeom prst="rect">
             <a:avLst/>
@@ -6644,7 +6849,7 @@
     </p:spTree>
     <p:extLst>
       <p:ext uri="{BB962C8B-B14F-4D97-AF65-F5344CB8AC3E}">
-        <p14:creationId xmlns:p14="http://schemas.microsoft.com/office/powerpoint/2010/main" val="2618550669"/>
+        <p14:creationId xmlns:p14="http://schemas.microsoft.com/office/powerpoint/2010/main" val="3497621925"/>
       </p:ext>
     </p:extLst>
   </p:cSld>
@@ -6934,8 +7139,23 @@
                 </a:solidFill>
                 <a:latin typeface="Quicksand" panose="02070303000000060000" pitchFamily="18" charset="0"/>
               </a:rPr>
-              <a:t>Schedule</a:t>
-            </a:r>
+              <a:t>Recipe Page (/recipes</a:t>
+            </a:r>
+            <a:r>
+              <a:rPr lang="en-US" b="1">
+                <a:solidFill>
+                  <a:schemeClr val="bg1"/>
+                </a:solidFill>
+                <a:latin typeface="Quicksand" panose="02070303000000060000" pitchFamily="18" charset="0"/>
+              </a:rPr>
+              <a:t>/:slug)</a:t>
+            </a:r>
+            <a:endParaRPr lang="en-US" b="1" dirty="0">
+              <a:solidFill>
+                <a:schemeClr val="bg1"/>
+              </a:solidFill>
+              <a:latin typeface="Quicksand" panose="02070303000000060000" pitchFamily="18" charset="0"/>
+            </a:endParaRPr>
           </a:p>
         </p:txBody>
       </p:sp>
@@ -7057,6 +7277,452 @@
           </a:p>
         </p:txBody>
       </p:sp>
+      <p:pic>
+        <p:nvPicPr>
+          <p:cNvPr id="3" name="Picture 2">
+            <a:extLst>
+              <a:ext uri="{FF2B5EF4-FFF2-40B4-BE49-F238E27FC236}">
+                <a16:creationId xmlns:a16="http://schemas.microsoft.com/office/drawing/2014/main" id="{617AA094-363D-4AAD-93CB-8696CADC7C0B}"/>
+              </a:ext>
+            </a:extLst>
+          </p:cNvPr>
+          <p:cNvPicPr>
+            <a:picLocks noChangeAspect="1"/>
+          </p:cNvPicPr>
+          <p:nvPr/>
+        </p:nvPicPr>
+        <p:blipFill>
+          <a:blip r:embed="rId3"/>
+          <a:stretch>
+            <a:fillRect/>
+          </a:stretch>
+        </p:blipFill>
+        <p:spPr>
+          <a:xfrm>
+            <a:off x="611883" y="1645623"/>
+            <a:ext cx="9134475" cy="2676525"/>
+          </a:xfrm>
+          <a:prstGeom prst="rect">
+            <a:avLst/>
+          </a:prstGeom>
+        </p:spPr>
+      </p:pic>
+    </p:spTree>
+    <p:extLst>
+      <p:ext uri="{BB962C8B-B14F-4D97-AF65-F5344CB8AC3E}">
+        <p14:creationId xmlns:p14="http://schemas.microsoft.com/office/powerpoint/2010/main" val="2618550669"/>
+      </p:ext>
+    </p:extLst>
+  </p:cSld>
+  <p:clrMapOvr>
+    <a:masterClrMapping/>
+  </p:clrMapOvr>
+  <p:transition spd="slow">
+    <p:push dir="u"/>
+  </p:transition>
+</p:sld>
+</file>
+
+<file path=ppt/slides/slide7.xml><?xml version="1.0" encoding="utf-8"?>
+<p:sld xmlns:a="http://schemas.openxmlformats.org/drawingml/2006/main" xmlns:r="http://schemas.openxmlformats.org/officeDocument/2006/relationships" xmlns:p="http://schemas.openxmlformats.org/presentationml/2006/main">
+  <p:cSld>
+    <p:bg>
+      <p:bgPr>
+        <a:solidFill>
+          <a:srgbClr val="CE2D75"/>
+        </a:solidFill>
+        <a:effectLst/>
+      </p:bgPr>
+    </p:bg>
+    <p:spTree>
+      <p:nvGrpSpPr>
+        <p:cNvPr id="1" name=""/>
+        <p:cNvGrpSpPr/>
+        <p:nvPr/>
+      </p:nvGrpSpPr>
+      <p:grpSpPr>
+        <a:xfrm>
+          <a:off x="0" y="0"/>
+          <a:ext cx="0" cy="0"/>
+          <a:chOff x="0" y="0"/>
+          <a:chExt cx="0" cy="0"/>
+        </a:xfrm>
+      </p:grpSpPr>
+      <p:sp>
+        <p:nvSpPr>
+          <p:cNvPr id="7" name="Rectangle 6">
+            <a:extLst>
+              <a:ext uri="{FF2B5EF4-FFF2-40B4-BE49-F238E27FC236}">
+                <a16:creationId xmlns:a16="http://schemas.microsoft.com/office/drawing/2014/main" id="{A6850917-8652-4383-995B-9767AA7442AE}"/>
+              </a:ext>
+            </a:extLst>
+          </p:cNvPr>
+          <p:cNvSpPr/>
+          <p:nvPr/>
+        </p:nvSpPr>
+        <p:spPr>
+          <a:xfrm rot="10800000">
+            <a:off x="9714271" y="-2266335"/>
+            <a:ext cx="2477729" cy="12565626"/>
+          </a:xfrm>
+          <a:prstGeom prst="rect">
+            <a:avLst/>
+          </a:prstGeom>
+          <a:solidFill>
+            <a:srgbClr val="CE2D75"/>
+          </a:solidFill>
+          <a:ln>
+            <a:noFill/>
+          </a:ln>
+          <a:effectLst>
+            <a:innerShdw blurRad="546100" dist="50800">
+              <a:prstClr val="black">
+                <a:alpha val="45000"/>
+              </a:prstClr>
+            </a:innerShdw>
+          </a:effectLst>
+        </p:spPr>
+        <p:style>
+          <a:lnRef idx="2">
+            <a:schemeClr val="accent1">
+              <a:shade val="50000"/>
+            </a:schemeClr>
+          </a:lnRef>
+          <a:fillRef idx="1">
+            <a:schemeClr val="accent1"/>
+          </a:fillRef>
+          <a:effectRef idx="0">
+            <a:schemeClr val="accent1"/>
+          </a:effectRef>
+          <a:fontRef idx="minor">
+            <a:schemeClr val="lt1"/>
+          </a:fontRef>
+        </p:style>
+        <p:txBody>
+          <a:bodyPr rtlCol="0" anchor="ctr"/>
+          <a:lstStyle/>
+          <a:p>
+            <a:pPr algn="ctr"/>
+            <a:endParaRPr lang="en-US"/>
+          </a:p>
+        </p:txBody>
+      </p:sp>
+      <p:sp>
+        <p:nvSpPr>
+          <p:cNvPr id="8" name="Rectangle 7">
+            <a:extLst>
+              <a:ext uri="{FF2B5EF4-FFF2-40B4-BE49-F238E27FC236}">
+                <a16:creationId xmlns:a16="http://schemas.microsoft.com/office/drawing/2014/main" id="{887F3168-6639-4E53-8D6F-D90E84D40768}"/>
+              </a:ext>
+            </a:extLst>
+          </p:cNvPr>
+          <p:cNvSpPr/>
+          <p:nvPr/>
+        </p:nvSpPr>
+        <p:spPr>
+          <a:xfrm rot="10800000">
+            <a:off x="8038004" y="-2477729"/>
+            <a:ext cx="3416710" cy="13219471"/>
+          </a:xfrm>
+          <a:prstGeom prst="rect">
+            <a:avLst/>
+          </a:prstGeom>
+          <a:solidFill>
+            <a:srgbClr val="CE2D75"/>
+          </a:solidFill>
+          <a:ln>
+            <a:noFill/>
+          </a:ln>
+          <a:effectLst/>
+        </p:spPr>
+        <p:style>
+          <a:lnRef idx="2">
+            <a:schemeClr val="accent1">
+              <a:shade val="50000"/>
+            </a:schemeClr>
+          </a:lnRef>
+          <a:fillRef idx="1">
+            <a:schemeClr val="accent1"/>
+          </a:fillRef>
+          <a:effectRef idx="0">
+            <a:schemeClr val="accent1"/>
+          </a:effectRef>
+          <a:fontRef idx="minor">
+            <a:schemeClr val="lt1"/>
+          </a:fontRef>
+        </p:style>
+        <p:txBody>
+          <a:bodyPr rtlCol="0" anchor="ctr"/>
+          <a:lstStyle/>
+          <a:p>
+            <a:pPr algn="ctr"/>
+            <a:endParaRPr lang="en-US" dirty="0"/>
+          </a:p>
+        </p:txBody>
+      </p:sp>
+      <p:sp>
+        <p:nvSpPr>
+          <p:cNvPr id="9" name="Rectangle 8">
+            <a:extLst>
+              <a:ext uri="{FF2B5EF4-FFF2-40B4-BE49-F238E27FC236}">
+                <a16:creationId xmlns:a16="http://schemas.microsoft.com/office/drawing/2014/main" id="{FDD1ACB1-7FEE-4262-A3F7-5E130DBBB513}"/>
+              </a:ext>
+            </a:extLst>
+          </p:cNvPr>
+          <p:cNvSpPr/>
+          <p:nvPr/>
+        </p:nvSpPr>
+        <p:spPr>
+          <a:xfrm>
+            <a:off x="0" y="-2477729"/>
+            <a:ext cx="2477729" cy="12565626"/>
+          </a:xfrm>
+          <a:prstGeom prst="rect">
+            <a:avLst/>
+          </a:prstGeom>
+          <a:solidFill>
+            <a:srgbClr val="CE2D75"/>
+          </a:solidFill>
+          <a:ln>
+            <a:noFill/>
+          </a:ln>
+          <a:effectLst>
+            <a:innerShdw blurRad="546100" dist="50800" dir="10800000">
+              <a:prstClr val="black">
+                <a:alpha val="45000"/>
+              </a:prstClr>
+            </a:innerShdw>
+          </a:effectLst>
+        </p:spPr>
+        <p:style>
+          <a:lnRef idx="2">
+            <a:schemeClr val="accent1">
+              <a:shade val="50000"/>
+            </a:schemeClr>
+          </a:lnRef>
+          <a:fillRef idx="1">
+            <a:schemeClr val="accent1"/>
+          </a:fillRef>
+          <a:effectRef idx="0">
+            <a:schemeClr val="accent1"/>
+          </a:effectRef>
+          <a:fontRef idx="minor">
+            <a:schemeClr val="lt1"/>
+          </a:fontRef>
+        </p:style>
+        <p:txBody>
+          <a:bodyPr rtlCol="0" anchor="ctr"/>
+          <a:lstStyle/>
+          <a:p>
+            <a:pPr algn="ctr"/>
+            <a:endParaRPr lang="en-US"/>
+          </a:p>
+        </p:txBody>
+      </p:sp>
+      <p:sp>
+        <p:nvSpPr>
+          <p:cNvPr id="10" name="Rectangle 9">
+            <a:extLst>
+              <a:ext uri="{FF2B5EF4-FFF2-40B4-BE49-F238E27FC236}">
+                <a16:creationId xmlns:a16="http://schemas.microsoft.com/office/drawing/2014/main" id="{1EF2AD43-D3C4-41B6-B450-19320FAFBC3D}"/>
+              </a:ext>
+            </a:extLst>
+          </p:cNvPr>
+          <p:cNvSpPr/>
+          <p:nvPr/>
+        </p:nvSpPr>
+        <p:spPr>
+          <a:xfrm>
+            <a:off x="513403" y="-2920180"/>
+            <a:ext cx="3416710" cy="13219471"/>
+          </a:xfrm>
+          <a:prstGeom prst="rect">
+            <a:avLst/>
+          </a:prstGeom>
+          <a:solidFill>
+            <a:srgbClr val="CE2D75"/>
+          </a:solidFill>
+          <a:ln>
+            <a:noFill/>
+          </a:ln>
+          <a:effectLst/>
+        </p:spPr>
+        <p:style>
+          <a:lnRef idx="2">
+            <a:schemeClr val="accent1">
+              <a:shade val="50000"/>
+            </a:schemeClr>
+          </a:lnRef>
+          <a:fillRef idx="1">
+            <a:schemeClr val="accent1"/>
+          </a:fillRef>
+          <a:effectRef idx="0">
+            <a:schemeClr val="accent1"/>
+          </a:effectRef>
+          <a:fontRef idx="minor">
+            <a:schemeClr val="lt1"/>
+          </a:fontRef>
+        </p:style>
+        <p:txBody>
+          <a:bodyPr rtlCol="0" anchor="ctr"/>
+          <a:lstStyle/>
+          <a:p>
+            <a:pPr algn="ctr"/>
+            <a:endParaRPr lang="en-US"/>
+          </a:p>
+        </p:txBody>
+      </p:sp>
+      <p:sp>
+        <p:nvSpPr>
+          <p:cNvPr id="2" name="Title 1">
+            <a:extLst>
+              <a:ext uri="{FF2B5EF4-FFF2-40B4-BE49-F238E27FC236}">
+                <a16:creationId xmlns:a16="http://schemas.microsoft.com/office/drawing/2014/main" id="{BB6B329F-66D6-42EE-82DD-B81655B95A17}"/>
+              </a:ext>
+            </a:extLst>
+          </p:cNvPr>
+          <p:cNvSpPr>
+            <a:spLocks noGrp="1"/>
+          </p:cNvSpPr>
+          <p:nvPr>
+            <p:ph type="title"/>
+          </p:nvPr>
+        </p:nvSpPr>
+        <p:spPr/>
+        <p:txBody>
+          <a:bodyPr/>
+          <a:lstStyle/>
+          <a:p>
+            <a:r>
+              <a:rPr lang="en-US" b="1" dirty="0">
+                <a:solidFill>
+                  <a:schemeClr val="bg1"/>
+                </a:solidFill>
+                <a:latin typeface="Quicksand" panose="02070303000000060000" pitchFamily="18" charset="0"/>
+              </a:rPr>
+              <a:t>Schedule</a:t>
+            </a:r>
+          </a:p>
+        </p:txBody>
+      </p:sp>
+      <p:sp>
+        <p:nvSpPr>
+          <p:cNvPr id="4" name="Rectangle 3">
+            <a:extLst>
+              <a:ext uri="{FF2B5EF4-FFF2-40B4-BE49-F238E27FC236}">
+                <a16:creationId xmlns:a16="http://schemas.microsoft.com/office/drawing/2014/main" id="{379CDECF-74BF-44F4-92E3-2A273826367E}"/>
+              </a:ext>
+            </a:extLst>
+          </p:cNvPr>
+          <p:cNvSpPr/>
+          <p:nvPr/>
+        </p:nvSpPr>
+        <p:spPr>
+          <a:xfrm>
+            <a:off x="10206681" y="-840259"/>
+            <a:ext cx="963827" cy="8501448"/>
+          </a:xfrm>
+          <a:prstGeom prst="rect">
+            <a:avLst/>
+          </a:prstGeom>
+          <a:solidFill>
+            <a:srgbClr val="861657"/>
+          </a:solidFill>
+          <a:ln>
+            <a:noFill/>
+          </a:ln>
+          <a:effectLst>
+            <a:outerShdw blurRad="63500" sx="102000" sy="102000" algn="ctr" rotWithShape="0">
+              <a:prstClr val="black">
+                <a:alpha val="40000"/>
+              </a:prstClr>
+            </a:outerShdw>
+          </a:effectLst>
+        </p:spPr>
+        <p:style>
+          <a:lnRef idx="2">
+            <a:schemeClr val="accent1">
+              <a:shade val="50000"/>
+            </a:schemeClr>
+          </a:lnRef>
+          <a:fillRef idx="1">
+            <a:schemeClr val="accent1"/>
+          </a:fillRef>
+          <a:effectRef idx="0">
+            <a:schemeClr val="accent1"/>
+          </a:effectRef>
+          <a:fontRef idx="minor">
+            <a:schemeClr val="lt1"/>
+          </a:fontRef>
+        </p:style>
+        <p:txBody>
+          <a:bodyPr rtlCol="0" anchor="ctr"/>
+          <a:lstStyle/>
+          <a:p>
+            <a:pPr algn="ctr"/>
+            <a:endParaRPr lang="en-US"/>
+          </a:p>
+        </p:txBody>
+      </p:sp>
+      <p:sp>
+        <p:nvSpPr>
+          <p:cNvPr id="5" name="Rectangle 4">
+            <a:extLst>
+              <a:ext uri="{FF2B5EF4-FFF2-40B4-BE49-F238E27FC236}">
+                <a16:creationId xmlns:a16="http://schemas.microsoft.com/office/drawing/2014/main" id="{90080D6F-F4A9-42C9-BCAE-E72A037517C3}"/>
+              </a:ext>
+            </a:extLst>
+          </p:cNvPr>
+          <p:cNvSpPr/>
+          <p:nvPr/>
+        </p:nvSpPr>
+        <p:spPr>
+          <a:xfrm>
+            <a:off x="11372336" y="-821724"/>
+            <a:ext cx="243016" cy="8501448"/>
+          </a:xfrm>
+          <a:prstGeom prst="rect">
+            <a:avLst/>
+          </a:prstGeom>
+          <a:solidFill>
+            <a:srgbClr val="861657"/>
+          </a:solidFill>
+          <a:ln>
+            <a:noFill/>
+          </a:ln>
+          <a:effectLst>
+            <a:outerShdw blurRad="63500" sx="102000" sy="102000" algn="ctr" rotWithShape="0">
+              <a:prstClr val="black">
+                <a:alpha val="40000"/>
+              </a:prstClr>
+            </a:outerShdw>
+          </a:effectLst>
+        </p:spPr>
+        <p:style>
+          <a:lnRef idx="2">
+            <a:schemeClr val="accent1">
+              <a:shade val="50000"/>
+            </a:schemeClr>
+          </a:lnRef>
+          <a:fillRef idx="1">
+            <a:schemeClr val="accent1"/>
+          </a:fillRef>
+          <a:effectRef idx="0">
+            <a:schemeClr val="accent1"/>
+          </a:effectRef>
+          <a:fontRef idx="minor">
+            <a:schemeClr val="lt1"/>
+          </a:fontRef>
+        </p:style>
+        <p:txBody>
+          <a:bodyPr rtlCol="0" anchor="ctr"/>
+          <a:lstStyle/>
+          <a:p>
+            <a:pPr algn="ctr"/>
+            <a:endParaRPr lang="en-US"/>
+          </a:p>
+        </p:txBody>
+      </p:sp>
       <p:sp>
         <p:nvSpPr>
           <p:cNvPr id="12" name="Content Placeholder 2">
@@ -7910,7 +8576,7 @@
 </p:sld>
 </file>
 
-<file path=ppt/slides/slide7.xml><?xml version="1.0" encoding="utf-8"?>
+<file path=ppt/slides/slide8.xml><?xml version="1.0" encoding="utf-8"?>
 <p:sld xmlns:a="http://schemas.openxmlformats.org/drawingml/2006/main" xmlns:r="http://schemas.openxmlformats.org/officeDocument/2006/relationships" xmlns:p="http://schemas.openxmlformats.org/presentationml/2006/main">
   <p:cSld>
     <p:bg>

</xml_diff>